<commit_message>
Changed Abstract's table, removed Existing tools
</commit_message>
<xml_diff>
--- a/docs/Project_Presentation_latest.pptx
+++ b/docs/Project_Presentation_latest.pptx
@@ -268,7 +268,7 @@
       <p15:sldGuideLst xmlns:p15="http://schemas.microsoft.com/office/powerpoint/2012/main"/>
     </p:ext>
     <p:ext uri="http://customooxmlschemas.google.com/">
-      <go:slidesCustomData xmlns:go="http://customooxmlschemas.google.com/" xmlns:ahyp="http://schemas.microsoft.com/office/drawing/2018/hyperlinkcolor" xmlns:p15="http://schemas.microsoft.com/office/powerpoint/2012/main" xmlns:p14="http://schemas.microsoft.com/office/powerpoint/2010/main" xmlns:com="http://schemas.openxmlformats.org/drawingml/2006/compatibility" xmlns:pvml="urn:schemas-microsoft-com:office:powerpoint" xmlns:v="urn:schemas-microsoft-com:vml" xmlns:o="urn:schemas-microsoft-com:office:office" xmlns:dgm="http://schemas.openxmlformats.org/drawingml/2006/diagram" xmlns:c="http://schemas.openxmlformats.org/drawingml/2006/chart" xmlns:mv="urn:schemas-microsoft-com:mac:vml" xmlns:mc="http://schemas.openxmlformats.org/markup-compatibility/2006" xmlns="" r:id="rId21" roundtripDataSignature="AMtx7mj3d4EaMShFC+vrm4NiNnFInjn2pQ=="/>
+      <go:slidesCustomData xmlns="" xmlns:mc="http://schemas.openxmlformats.org/markup-compatibility/2006" xmlns:mv="urn:schemas-microsoft-com:mac:vml" xmlns:c="http://schemas.openxmlformats.org/drawingml/2006/chart" xmlns:dgm="http://schemas.openxmlformats.org/drawingml/2006/diagram" xmlns:o="urn:schemas-microsoft-com:office:office" xmlns:v="urn:schemas-microsoft-com:vml" xmlns:pvml="urn:schemas-microsoft-com:office:powerpoint" xmlns:com="http://schemas.openxmlformats.org/drawingml/2006/compatibility" xmlns:p14="http://schemas.microsoft.com/office/powerpoint/2010/main" xmlns:p15="http://schemas.microsoft.com/office/powerpoint/2012/main" xmlns:ahyp="http://schemas.microsoft.com/office/drawing/2018/hyperlinkcolor" xmlns:go="http://customooxmlschemas.google.com/" r:id="rId21" roundtripDataSignature="AMtx7mj3d4EaMShFC+vrm4NiNnFInjn2pQ=="/>
     </p:ext>
   </p:extLst>
 </p:presentation>
@@ -1473,7 +1473,11 @@
               </a:spcAft>
               <a:buNone/>
             </a:pPr>
-            <a:endParaRPr/>
+            <a:r>
+              <a:rPr lang="fi-FI" dirty="0"/>
+              <a:t>Table: Nine most common words from Wikicorpus with their frequency, rank and probability.</a:t>
+            </a:r>
+            <a:endParaRPr dirty="0"/>
           </a:p>
         </p:txBody>
       </p:sp>
@@ -1785,7 +1789,7 @@
               </a:spcAft>
               <a:buNone/>
             </a:pPr>
-            <a:endParaRPr/>
+            <a:endParaRPr dirty="0"/>
           </a:p>
         </p:txBody>
       </p:sp>
@@ -8009,92 +8013,6 @@
           </a:p>
         </p:txBody>
       </p:sp>
-      <p:pic>
-        <p:nvPicPr>
-          <p:cNvPr id="116" name="Google Shape;116;p2"/>
-          <p:cNvPicPr preferRelativeResize="0"/>
-          <p:nvPr/>
-        </p:nvPicPr>
-        <p:blipFill>
-          <a:blip r:embed="rId3">
-            <a:alphaModFix/>
-          </a:blip>
-          <a:stretch>
-            <a:fillRect/>
-          </a:stretch>
-        </p:blipFill>
-        <p:spPr>
-          <a:xfrm>
-            <a:off x="5221198" y="2878199"/>
-            <a:ext cx="2662400" cy="2736650"/>
-          </a:xfrm>
-          <a:prstGeom prst="rect">
-            <a:avLst/>
-          </a:prstGeom>
-          <a:noFill/>
-          <a:ln>
-            <a:noFill/>
-          </a:ln>
-        </p:spPr>
-      </p:pic>
-      <p:sp>
-        <p:nvSpPr>
-          <p:cNvPr id="117" name="Google Shape;117;p2"/>
-          <p:cNvSpPr txBox="1"/>
-          <p:nvPr/>
-        </p:nvSpPr>
-        <p:spPr>
-          <a:xfrm>
-            <a:off x="1191349" y="6116150"/>
-            <a:ext cx="7887995" cy="696300"/>
-          </a:xfrm>
-          <a:prstGeom prst="rect">
-            <a:avLst/>
-          </a:prstGeom>
-          <a:noFill/>
-          <a:ln>
-            <a:noFill/>
-          </a:ln>
-        </p:spPr>
-        <p:txBody>
-          <a:bodyPr spcFirstLastPara="1" wrap="square" lIns="91425" tIns="91425" rIns="91425" bIns="91425" anchor="t" anchorCtr="0">
-            <a:noAutofit/>
-          </a:bodyPr>
-          <a:lstStyle/>
-          <a:p>
-            <a:pPr marL="0" lvl="0" indent="0" algn="l" rtl="0">
-              <a:spcBef>
-                <a:spcPts val="0"/>
-              </a:spcBef>
-              <a:spcAft>
-                <a:spcPts val="0"/>
-              </a:spcAft>
-              <a:buNone/>
-            </a:pPr>
-            <a:r>
-              <a:rPr lang="fi-FI" dirty="0">
-                <a:solidFill>
-                  <a:schemeClr val="accent2"/>
-                </a:solidFill>
-                <a:latin typeface="Century Schoolbook"/>
-                <a:ea typeface="Century Schoolbook"/>
-                <a:cs typeface="Century Schoolbook"/>
-                <a:sym typeface="Century Schoolbook"/>
-              </a:rPr>
-              <a:t>Image source: [Lisää kuvan lähde tai tee vastaava taulukko omasta datasta]</a:t>
-            </a:r>
-            <a:endParaRPr dirty="0">
-              <a:solidFill>
-                <a:schemeClr val="accent2"/>
-              </a:solidFill>
-              <a:latin typeface="Century Schoolbook"/>
-              <a:ea typeface="Century Schoolbook"/>
-              <a:cs typeface="Century Schoolbook"/>
-              <a:sym typeface="Century Schoolbook"/>
-            </a:endParaRPr>
-          </a:p>
-        </p:txBody>
-      </p:sp>
       <p:sp>
         <p:nvSpPr>
           <p:cNvPr id="118" name="Google Shape;118;p2"/>
@@ -8149,7 +8067,7 @@
         </p:nvSpPr>
         <p:spPr>
           <a:xfrm>
-            <a:off x="3091375" y="3735150"/>
+            <a:off x="2636589" y="4039627"/>
             <a:ext cx="3000000" cy="497100"/>
           </a:xfrm>
           <a:prstGeom prst="rect">
@@ -8191,6 +8109,797 @@
           </a:p>
         </p:txBody>
       </p:sp>
+      <p:graphicFrame>
+        <p:nvGraphicFramePr>
+          <p:cNvPr id="8" name="Table 2">
+            <a:extLst>
+              <a:ext uri="{FF2B5EF4-FFF2-40B4-BE49-F238E27FC236}">
+                <a16:creationId xmlns:a16="http://schemas.microsoft.com/office/drawing/2014/main" id="{A93511A8-BF5F-4A92-BBB0-12DEB8440210}"/>
+              </a:ext>
+            </a:extLst>
+          </p:cNvPr>
+          <p:cNvGraphicFramePr>
+            <a:graphicFrameLocks noGrp="1"/>
+          </p:cNvGraphicFramePr>
+          <p:nvPr>
+            <p:extLst>
+              <p:ext uri="{D42A27DB-BD31-4B8C-83A1-F6EECF244321}">
+                <p14:modId xmlns:p14="http://schemas.microsoft.com/office/powerpoint/2010/main" val="4014510939"/>
+              </p:ext>
+            </p:extLst>
+          </p:nvPr>
+        </p:nvGraphicFramePr>
+        <p:xfrm>
+          <a:off x="5489000" y="2654823"/>
+          <a:ext cx="4524420" cy="3497630"/>
+        </p:xfrm>
+        <a:graphic>
+          <a:graphicData uri="http://schemas.openxmlformats.org/drawingml/2006/table">
+            <a:tbl>
+              <a:tblPr firstRow="1" bandRow="1">
+                <a:tableStyleId>{5C22544A-7EE6-4342-B048-85BDC9FD1C3A}</a:tableStyleId>
+              </a:tblPr>
+              <a:tblGrid>
+                <a:gridCol w="647296">
+                  <a:extLst>
+                    <a:ext uri="{9D8B030D-6E8A-4147-A177-3AD203B41FA5}">
+                      <a16:colId xmlns:a16="http://schemas.microsoft.com/office/drawing/2014/main" val="2020948370"/>
+                    </a:ext>
+                  </a:extLst>
+                </a:gridCol>
+                <a:gridCol w="1178904">
+                  <a:extLst>
+                    <a:ext uri="{9D8B030D-6E8A-4147-A177-3AD203B41FA5}">
+                      <a16:colId xmlns:a16="http://schemas.microsoft.com/office/drawing/2014/main" val="2191345118"/>
+                    </a:ext>
+                  </a:extLst>
+                </a:gridCol>
+                <a:gridCol w="463138">
+                  <a:extLst>
+                    <a:ext uri="{9D8B030D-6E8A-4147-A177-3AD203B41FA5}">
+                      <a16:colId xmlns:a16="http://schemas.microsoft.com/office/drawing/2014/main" val="1010332485"/>
+                    </a:ext>
+                  </a:extLst>
+                </a:gridCol>
+                <a:gridCol w="911085">
+                  <a:extLst>
+                    <a:ext uri="{9D8B030D-6E8A-4147-A177-3AD203B41FA5}">
+                      <a16:colId xmlns:a16="http://schemas.microsoft.com/office/drawing/2014/main" val="1328164752"/>
+                    </a:ext>
+                  </a:extLst>
+                </a:gridCol>
+                <a:gridCol w="1323997">
+                  <a:extLst>
+                    <a:ext uri="{9D8B030D-6E8A-4147-A177-3AD203B41FA5}">
+                      <a16:colId xmlns:a16="http://schemas.microsoft.com/office/drawing/2014/main" val="2937167656"/>
+                    </a:ext>
+                  </a:extLst>
+                </a:gridCol>
+              </a:tblGrid>
+              <a:tr h="349763">
+                <a:tc>
+                  <a:txBody>
+                    <a:bodyPr/>
+                    <a:lstStyle/>
+                    <a:p>
+                      <a:r>
+                        <a:rPr lang="fi-FI" dirty="0"/>
+                        <a:t>Word</a:t>
+                      </a:r>
+                    </a:p>
+                  </a:txBody>
+                  <a:tcPr/>
+                </a:tc>
+                <a:tc>
+                  <a:txBody>
+                    <a:bodyPr/>
+                    <a:lstStyle/>
+                    <a:p>
+                      <a:r>
+                        <a:rPr lang="fi-FI" dirty="0"/>
+                        <a:t>Frequency</a:t>
+                      </a:r>
+                    </a:p>
+                  </a:txBody>
+                  <a:tcPr/>
+                </a:tc>
+                <a:tc>
+                  <a:txBody>
+                    <a:bodyPr/>
+                    <a:lstStyle/>
+                    <a:p>
+                      <a:r>
+                        <a:rPr lang="fi-FI" dirty="0"/>
+                        <a:t>r</a:t>
+                      </a:r>
+                    </a:p>
+                  </a:txBody>
+                  <a:tcPr/>
+                </a:tc>
+                <a:tc>
+                  <a:txBody>
+                    <a:bodyPr/>
+                    <a:lstStyle/>
+                    <a:p>
+                      <a:r>
+                        <a:rPr lang="fi-FI" dirty="0"/>
+                        <a:t>Pr</a:t>
+                      </a:r>
+                    </a:p>
+                  </a:txBody>
+                  <a:tcPr/>
+                </a:tc>
+                <a:tc>
+                  <a:txBody>
+                    <a:bodyPr/>
+                    <a:lstStyle/>
+                    <a:p>
+                      <a:r>
+                        <a:rPr lang="fi-FI" dirty="0"/>
+                        <a:t>r x Pr</a:t>
+                      </a:r>
+                    </a:p>
+                  </a:txBody>
+                  <a:tcPr/>
+                </a:tc>
+                <a:extLst>
+                  <a:ext uri="{0D108BD9-81ED-4DB2-BD59-A6C34878D82A}">
+                    <a16:rowId xmlns:a16="http://schemas.microsoft.com/office/drawing/2014/main" val="860323105"/>
+                  </a:ext>
+                </a:extLst>
+              </a:tr>
+              <a:tr h="349763">
+                <a:tc>
+                  <a:txBody>
+                    <a:bodyPr/>
+                    <a:lstStyle/>
+                    <a:p>
+                      <a:r>
+                        <a:rPr lang="fi-FI" dirty="0"/>
+                        <a:t>the</a:t>
+                      </a:r>
+                    </a:p>
+                  </a:txBody>
+                  <a:tcPr/>
+                </a:tc>
+                <a:tc>
+                  <a:txBody>
+                    <a:bodyPr/>
+                    <a:lstStyle/>
+                    <a:p>
+                      <a:r>
+                        <a:rPr lang="fi-FI" dirty="0"/>
+                        <a:t>89815185</a:t>
+                      </a:r>
+                    </a:p>
+                  </a:txBody>
+                  <a:tcPr/>
+                </a:tc>
+                <a:tc>
+                  <a:txBody>
+                    <a:bodyPr/>
+                    <a:lstStyle/>
+                    <a:p>
+                      <a:r>
+                        <a:rPr lang="fi-FI" dirty="0"/>
+                        <a:t>1</a:t>
+                      </a:r>
+                    </a:p>
+                  </a:txBody>
+                  <a:tcPr/>
+                </a:tc>
+                <a:tc>
+                  <a:txBody>
+                    <a:bodyPr/>
+                    <a:lstStyle/>
+                    <a:p>
+                      <a:r>
+                        <a:rPr lang="fi-FI" dirty="0"/>
+                        <a:t>7.03 %</a:t>
+                      </a:r>
+                    </a:p>
+                  </a:txBody>
+                  <a:tcPr/>
+                </a:tc>
+                <a:tc>
+                  <a:txBody>
+                    <a:bodyPr/>
+                    <a:lstStyle/>
+                    <a:p>
+                      <a:r>
+                        <a:rPr lang="fi-FI" dirty="0"/>
+                        <a:t>0.0703</a:t>
+                      </a:r>
+                    </a:p>
+                  </a:txBody>
+                  <a:tcPr/>
+                </a:tc>
+                <a:extLst>
+                  <a:ext uri="{0D108BD9-81ED-4DB2-BD59-A6C34878D82A}">
+                    <a16:rowId xmlns:a16="http://schemas.microsoft.com/office/drawing/2014/main" val="1157172192"/>
+                  </a:ext>
+                </a:extLst>
+              </a:tr>
+              <a:tr h="349763">
+                <a:tc>
+                  <a:txBody>
+                    <a:bodyPr/>
+                    <a:lstStyle/>
+                    <a:p>
+                      <a:r>
+                        <a:rPr lang="fi-FI" dirty="0"/>
+                        <a:t>of</a:t>
+                      </a:r>
+                    </a:p>
+                  </a:txBody>
+                  <a:tcPr/>
+                </a:tc>
+                <a:tc>
+                  <a:txBody>
+                    <a:bodyPr/>
+                    <a:lstStyle/>
+                    <a:p>
+                      <a:r>
+                        <a:rPr lang="fi-FI" dirty="0"/>
+                        <a:t>45330518</a:t>
+                      </a:r>
+                    </a:p>
+                  </a:txBody>
+                  <a:tcPr/>
+                </a:tc>
+                <a:tc>
+                  <a:txBody>
+                    <a:bodyPr/>
+                    <a:lstStyle/>
+                    <a:p>
+                      <a:r>
+                        <a:rPr lang="fi-FI" dirty="0"/>
+                        <a:t>2</a:t>
+                      </a:r>
+                    </a:p>
+                  </a:txBody>
+                  <a:tcPr/>
+                </a:tc>
+                <a:tc>
+                  <a:txBody>
+                    <a:bodyPr/>
+                    <a:lstStyle/>
+                    <a:p>
+                      <a:r>
+                        <a:rPr lang="fi-FI" dirty="0"/>
+                        <a:t>3.55 %</a:t>
+                      </a:r>
+                    </a:p>
+                  </a:txBody>
+                  <a:tcPr/>
+                </a:tc>
+                <a:tc>
+                  <a:txBody>
+                    <a:bodyPr/>
+                    <a:lstStyle/>
+                    <a:p>
+                      <a:r>
+                        <a:rPr lang="fi-FI" dirty="0"/>
+                        <a:t>0.0709</a:t>
+                      </a:r>
+                    </a:p>
+                  </a:txBody>
+                  <a:tcPr/>
+                </a:tc>
+                <a:extLst>
+                  <a:ext uri="{0D108BD9-81ED-4DB2-BD59-A6C34878D82A}">
+                    <a16:rowId xmlns:a16="http://schemas.microsoft.com/office/drawing/2014/main" val="2442830095"/>
+                  </a:ext>
+                </a:extLst>
+              </a:tr>
+              <a:tr h="349763">
+                <a:tc>
+                  <a:txBody>
+                    <a:bodyPr/>
+                    <a:lstStyle/>
+                    <a:p>
+                      <a:r>
+                        <a:rPr lang="fi-FI" dirty="0"/>
+                        <a:t>and</a:t>
+                      </a:r>
+                    </a:p>
+                  </a:txBody>
+                  <a:tcPr/>
+                </a:tc>
+                <a:tc>
+                  <a:txBody>
+                    <a:bodyPr/>
+                    <a:lstStyle/>
+                    <a:p>
+                      <a:r>
+                        <a:rPr lang="fi-FI" dirty="0"/>
+                        <a:t>36990190</a:t>
+                      </a:r>
+                    </a:p>
+                  </a:txBody>
+                  <a:tcPr/>
+                </a:tc>
+                <a:tc>
+                  <a:txBody>
+                    <a:bodyPr/>
+                    <a:lstStyle/>
+                    <a:p>
+                      <a:r>
+                        <a:rPr lang="fi-FI" dirty="0"/>
+                        <a:t>3</a:t>
+                      </a:r>
+                    </a:p>
+                  </a:txBody>
+                  <a:tcPr/>
+                </a:tc>
+                <a:tc>
+                  <a:txBody>
+                    <a:bodyPr/>
+                    <a:lstStyle/>
+                    <a:p>
+                      <a:r>
+                        <a:rPr lang="fi-FI" dirty="0"/>
+                        <a:t>2.89 %</a:t>
+                      </a:r>
+                    </a:p>
+                  </a:txBody>
+                  <a:tcPr/>
+                </a:tc>
+                <a:tc>
+                  <a:txBody>
+                    <a:bodyPr/>
+                    <a:lstStyle/>
+                    <a:p>
+                      <a:r>
+                        <a:rPr lang="fi-FI" dirty="0"/>
+                        <a:t>0.0868</a:t>
+                      </a:r>
+                    </a:p>
+                  </a:txBody>
+                  <a:tcPr/>
+                </a:tc>
+                <a:extLst>
+                  <a:ext uri="{0D108BD9-81ED-4DB2-BD59-A6C34878D82A}">
+                    <a16:rowId xmlns:a16="http://schemas.microsoft.com/office/drawing/2014/main" val="2952006102"/>
+                  </a:ext>
+                </a:extLst>
+              </a:tr>
+              <a:tr h="349763">
+                <a:tc>
+                  <a:txBody>
+                    <a:bodyPr/>
+                    <a:lstStyle/>
+                    <a:p>
+                      <a:r>
+                        <a:rPr lang="fi-FI" dirty="0"/>
+                        <a:t>in</a:t>
+                      </a:r>
+                    </a:p>
+                  </a:txBody>
+                  <a:tcPr/>
+                </a:tc>
+                <a:tc>
+                  <a:txBody>
+                    <a:bodyPr/>
+                    <a:lstStyle/>
+                    <a:p>
+                      <a:r>
+                        <a:rPr lang="fi-FI" dirty="0"/>
+                        <a:t>35021778</a:t>
+                      </a:r>
+                    </a:p>
+                  </a:txBody>
+                  <a:tcPr/>
+                </a:tc>
+                <a:tc>
+                  <a:txBody>
+                    <a:bodyPr/>
+                    <a:lstStyle/>
+                    <a:p>
+                      <a:r>
+                        <a:rPr lang="fi-FI" dirty="0"/>
+                        <a:t>4</a:t>
+                      </a:r>
+                    </a:p>
+                  </a:txBody>
+                  <a:tcPr/>
+                </a:tc>
+                <a:tc>
+                  <a:txBody>
+                    <a:bodyPr/>
+                    <a:lstStyle/>
+                    <a:p>
+                      <a:r>
+                        <a:rPr lang="fi-FI" dirty="0"/>
+                        <a:t>2.74 %</a:t>
+                      </a:r>
+                    </a:p>
+                  </a:txBody>
+                  <a:tcPr/>
+                </a:tc>
+                <a:tc>
+                  <a:txBody>
+                    <a:bodyPr/>
+                    <a:lstStyle/>
+                    <a:p>
+                      <a:r>
+                        <a:rPr lang="fi-FI" dirty="0"/>
+                        <a:t>0.1096</a:t>
+                      </a:r>
+                    </a:p>
+                  </a:txBody>
+                  <a:tcPr/>
+                </a:tc>
+                <a:extLst>
+                  <a:ext uri="{0D108BD9-81ED-4DB2-BD59-A6C34878D82A}">
+                    <a16:rowId xmlns:a16="http://schemas.microsoft.com/office/drawing/2014/main" val="2699994162"/>
+                  </a:ext>
+                </a:extLst>
+              </a:tr>
+              <a:tr h="349763">
+                <a:tc>
+                  <a:txBody>
+                    <a:bodyPr/>
+                    <a:lstStyle/>
+                    <a:p>
+                      <a:r>
+                        <a:rPr lang="fi-FI" dirty="0"/>
+                        <a:t>to</a:t>
+                      </a:r>
+                    </a:p>
+                  </a:txBody>
+                  <a:tcPr/>
+                </a:tc>
+                <a:tc>
+                  <a:txBody>
+                    <a:bodyPr/>
+                    <a:lstStyle/>
+                    <a:p>
+                      <a:r>
+                        <a:rPr lang="fi-FI" dirty="0"/>
+                        <a:t>25464415</a:t>
+                      </a:r>
+                    </a:p>
+                  </a:txBody>
+                  <a:tcPr/>
+                </a:tc>
+                <a:tc>
+                  <a:txBody>
+                    <a:bodyPr/>
+                    <a:lstStyle/>
+                    <a:p>
+                      <a:r>
+                        <a:rPr lang="fi-FI" dirty="0"/>
+                        <a:t>5</a:t>
+                      </a:r>
+                    </a:p>
+                  </a:txBody>
+                  <a:tcPr/>
+                </a:tc>
+                <a:tc>
+                  <a:txBody>
+                    <a:bodyPr/>
+                    <a:lstStyle/>
+                    <a:p>
+                      <a:r>
+                        <a:rPr lang="fi-FI" dirty="0"/>
+                        <a:t>1.99 %</a:t>
+                      </a:r>
+                    </a:p>
+                  </a:txBody>
+                  <a:tcPr/>
+                </a:tc>
+                <a:tc>
+                  <a:txBody>
+                    <a:bodyPr/>
+                    <a:lstStyle/>
+                    <a:p>
+                      <a:r>
+                        <a:rPr lang="fi-FI" dirty="0"/>
+                        <a:t>0.0996</a:t>
+                      </a:r>
+                    </a:p>
+                  </a:txBody>
+                  <a:tcPr/>
+                </a:tc>
+                <a:extLst>
+                  <a:ext uri="{0D108BD9-81ED-4DB2-BD59-A6C34878D82A}">
+                    <a16:rowId xmlns:a16="http://schemas.microsoft.com/office/drawing/2014/main" val="784099933"/>
+                  </a:ext>
+                </a:extLst>
+              </a:tr>
+              <a:tr h="349763">
+                <a:tc>
+                  <a:txBody>
+                    <a:bodyPr/>
+                    <a:lstStyle/>
+                    <a:p>
+                      <a:r>
+                        <a:rPr lang="fi-FI" dirty="0"/>
+                        <a:t>was</a:t>
+                      </a:r>
+                    </a:p>
+                  </a:txBody>
+                  <a:tcPr/>
+                </a:tc>
+                <a:tc>
+                  <a:txBody>
+                    <a:bodyPr/>
+                    <a:lstStyle/>
+                    <a:p>
+                      <a:r>
+                        <a:rPr lang="fi-FI" dirty="0"/>
+                        <a:t>13661416</a:t>
+                      </a:r>
+                    </a:p>
+                  </a:txBody>
+                  <a:tcPr/>
+                </a:tc>
+                <a:tc>
+                  <a:txBody>
+                    <a:bodyPr/>
+                    <a:lstStyle/>
+                    <a:p>
+                      <a:r>
+                        <a:rPr lang="fi-FI" dirty="0"/>
+                        <a:t>6</a:t>
+                      </a:r>
+                    </a:p>
+                  </a:txBody>
+                  <a:tcPr/>
+                </a:tc>
+                <a:tc>
+                  <a:txBody>
+                    <a:bodyPr/>
+                    <a:lstStyle/>
+                    <a:p>
+                      <a:r>
+                        <a:rPr lang="fi-FI" dirty="0"/>
+                        <a:t>1.07 %</a:t>
+                      </a:r>
+                    </a:p>
+                  </a:txBody>
+                  <a:tcPr/>
+                </a:tc>
+                <a:tc>
+                  <a:txBody>
+                    <a:bodyPr/>
+                    <a:lstStyle/>
+                    <a:p>
+                      <a:r>
+                        <a:rPr lang="fi-FI" dirty="0"/>
+                        <a:t>0.0641</a:t>
+                      </a:r>
+                    </a:p>
+                  </a:txBody>
+                  <a:tcPr/>
+                </a:tc>
+                <a:extLst>
+                  <a:ext uri="{0D108BD9-81ED-4DB2-BD59-A6C34878D82A}">
+                    <a16:rowId xmlns:a16="http://schemas.microsoft.com/office/drawing/2014/main" val="777796581"/>
+                  </a:ext>
+                </a:extLst>
+              </a:tr>
+              <a:tr h="349763">
+                <a:tc>
+                  <a:txBody>
+                    <a:bodyPr/>
+                    <a:lstStyle/>
+                    <a:p>
+                      <a:r>
+                        <a:rPr lang="fi-FI" dirty="0"/>
+                        <a:t>is</a:t>
+                      </a:r>
+                    </a:p>
+                  </a:txBody>
+                  <a:tcPr/>
+                </a:tc>
+                <a:tc>
+                  <a:txBody>
+                    <a:bodyPr/>
+                    <a:lstStyle/>
+                    <a:p>
+                      <a:r>
+                        <a:rPr lang="fi-FI" dirty="0"/>
+                        <a:t>11111438</a:t>
+                      </a:r>
+                    </a:p>
+                  </a:txBody>
+                  <a:tcPr/>
+                </a:tc>
+                <a:tc>
+                  <a:txBody>
+                    <a:bodyPr/>
+                    <a:lstStyle/>
+                    <a:p>
+                      <a:r>
+                        <a:rPr lang="fi-FI" dirty="0"/>
+                        <a:t>7</a:t>
+                      </a:r>
+                    </a:p>
+                  </a:txBody>
+                  <a:tcPr/>
+                </a:tc>
+                <a:tc>
+                  <a:txBody>
+                    <a:bodyPr/>
+                    <a:lstStyle/>
+                    <a:p>
+                      <a:r>
+                        <a:rPr lang="fi-FI" dirty="0"/>
+                        <a:t>0.87 %</a:t>
+                      </a:r>
+                    </a:p>
+                  </a:txBody>
+                  <a:tcPr/>
+                </a:tc>
+                <a:tc>
+                  <a:txBody>
+                    <a:bodyPr/>
+                    <a:lstStyle/>
+                    <a:p>
+                      <a:r>
+                        <a:rPr lang="fi-FI" dirty="0"/>
+                        <a:t>0.0608</a:t>
+                      </a:r>
+                    </a:p>
+                  </a:txBody>
+                  <a:tcPr/>
+                </a:tc>
+                <a:extLst>
+                  <a:ext uri="{0D108BD9-81ED-4DB2-BD59-A6C34878D82A}">
+                    <a16:rowId xmlns:a16="http://schemas.microsoft.com/office/drawing/2014/main" val="2166642458"/>
+                  </a:ext>
+                </a:extLst>
+              </a:tr>
+              <a:tr h="349763">
+                <a:tc>
+                  <a:txBody>
+                    <a:bodyPr/>
+                    <a:lstStyle/>
+                    <a:p>
+                      <a:r>
+                        <a:rPr lang="fi-FI" dirty="0"/>
+                        <a:t>for</a:t>
+                      </a:r>
+                    </a:p>
+                  </a:txBody>
+                  <a:tcPr/>
+                </a:tc>
+                <a:tc>
+                  <a:txBody>
+                    <a:bodyPr/>
+                    <a:lstStyle/>
+                    <a:p>
+                      <a:r>
+                        <a:rPr lang="fi-FI" dirty="0"/>
+                        <a:t>10635149</a:t>
+                      </a:r>
+                    </a:p>
+                  </a:txBody>
+                  <a:tcPr/>
+                </a:tc>
+                <a:tc>
+                  <a:txBody>
+                    <a:bodyPr/>
+                    <a:lstStyle/>
+                    <a:p>
+                      <a:r>
+                        <a:rPr lang="fi-FI" dirty="0"/>
+                        <a:t>8</a:t>
+                      </a:r>
+                    </a:p>
+                  </a:txBody>
+                  <a:tcPr/>
+                </a:tc>
+                <a:tc>
+                  <a:txBody>
+                    <a:bodyPr/>
+                    <a:lstStyle/>
+                    <a:p>
+                      <a:r>
+                        <a:rPr lang="fi-FI" dirty="0"/>
+                        <a:t>0.83 %</a:t>
+                      </a:r>
+                    </a:p>
+                  </a:txBody>
+                  <a:tcPr/>
+                </a:tc>
+                <a:tc>
+                  <a:txBody>
+                    <a:bodyPr/>
+                    <a:lstStyle/>
+                    <a:p>
+                      <a:r>
+                        <a:rPr lang="fi-FI" dirty="0"/>
+                        <a:t>0.0666</a:t>
+                      </a:r>
+                    </a:p>
+                  </a:txBody>
+                  <a:tcPr/>
+                </a:tc>
+                <a:extLst>
+                  <a:ext uri="{0D108BD9-81ED-4DB2-BD59-A6C34878D82A}">
+                    <a16:rowId xmlns:a16="http://schemas.microsoft.com/office/drawing/2014/main" val="479494359"/>
+                  </a:ext>
+                </a:extLst>
+              </a:tr>
+              <a:tr h="349763">
+                <a:tc>
+                  <a:txBody>
+                    <a:bodyPr/>
+                    <a:lstStyle/>
+                    <a:p>
+                      <a:r>
+                        <a:rPr lang="fi-FI" dirty="0"/>
+                        <a:t>as</a:t>
+                      </a:r>
+                    </a:p>
+                  </a:txBody>
+                  <a:tcPr/>
+                </a:tc>
+                <a:tc>
+                  <a:txBody>
+                    <a:bodyPr/>
+                    <a:lstStyle/>
+                    <a:p>
+                      <a:r>
+                        <a:rPr lang="fi-FI" dirty="0"/>
+                        <a:t>10471522</a:t>
+                      </a:r>
+                    </a:p>
+                  </a:txBody>
+                  <a:tcPr/>
+                </a:tc>
+                <a:tc>
+                  <a:txBody>
+                    <a:bodyPr/>
+                    <a:lstStyle/>
+                    <a:p>
+                      <a:r>
+                        <a:rPr lang="fi-FI" dirty="0"/>
+                        <a:t>9</a:t>
+                      </a:r>
+                    </a:p>
+                  </a:txBody>
+                  <a:tcPr/>
+                </a:tc>
+                <a:tc>
+                  <a:txBody>
+                    <a:bodyPr/>
+                    <a:lstStyle/>
+                    <a:p>
+                      <a:r>
+                        <a:rPr lang="fi-FI" dirty="0"/>
+                        <a:t>0.82 %</a:t>
+                      </a:r>
+                    </a:p>
+                  </a:txBody>
+                  <a:tcPr/>
+                </a:tc>
+                <a:tc>
+                  <a:txBody>
+                    <a:bodyPr/>
+                    <a:lstStyle/>
+                    <a:p>
+                      <a:r>
+                        <a:rPr lang="fi-FI" dirty="0"/>
+                        <a:t>0.0737</a:t>
+                      </a:r>
+                    </a:p>
+                  </a:txBody>
+                  <a:tcPr/>
+                </a:tc>
+                <a:extLst>
+                  <a:ext uri="{0D108BD9-81ED-4DB2-BD59-A6C34878D82A}">
+                    <a16:rowId xmlns:a16="http://schemas.microsoft.com/office/drawing/2014/main" val="2943040884"/>
+                  </a:ext>
+                </a:extLst>
+              </a:tr>
+            </a:tbl>
+          </a:graphicData>
+        </a:graphic>
+      </p:graphicFrame>
     </p:spTree>
   </p:cSld>
   <p:clrMapOvr>
@@ -9492,45 +10201,6 @@
               <a:buNone/>
             </a:pPr>
             <a:endParaRPr lang="fi-FI" dirty="0"/>
-          </a:p>
-          <a:p>
-            <a:pPr marL="182880" lvl="0" indent="-182880" algn="l" rtl="0">
-              <a:lnSpc>
-                <a:spcPct val="95000"/>
-              </a:lnSpc>
-              <a:spcBef>
-                <a:spcPts val="0"/>
-              </a:spcBef>
-              <a:spcAft>
-                <a:spcPts val="0"/>
-              </a:spcAft>
-              <a:buSzPts val="1440"/>
-              <a:buChar char="•"/>
-            </a:pPr>
-            <a:r>
-              <a:rPr lang="fi-FI" dirty="0"/>
-              <a:t>Existing Tools</a:t>
-            </a:r>
-          </a:p>
-          <a:p>
-            <a:pPr marL="640080" lvl="1" indent="-182880">
-              <a:lnSpc>
-                <a:spcPct val="95000"/>
-              </a:lnSpc>
-              <a:spcBef>
-                <a:spcPts val="0"/>
-              </a:spcBef>
-              <a:buSzPts val="1440"/>
-              <a:buChar char="•"/>
-            </a:pPr>
-            <a:r>
-              <a:rPr lang="fi-FI" dirty="0">
-                <a:solidFill>
-                  <a:schemeClr val="accent2"/>
-                </a:solidFill>
-              </a:rPr>
-              <a:t>[Something]</a:t>
-            </a:r>
           </a:p>
         </p:txBody>
       </p:sp>

</xml_diff>

<commit_message>
Added slide for GUI
</commit_message>
<xml_diff>
--- a/docs/Project_Presentation_latest.pptx
+++ b/docs/Project_Presentation_latest.pptx
@@ -5,7 +5,7 @@
     <p:sldMasterId id="2147483648" r:id="rId1"/>
   </p:sldMasterIdLst>
   <p:notesMasterIdLst>
-    <p:notesMasterId r:id="rId16"/>
+    <p:notesMasterId r:id="rId17"/>
   </p:notesMasterIdLst>
   <p:sldIdLst>
     <p:sldId id="256" r:id="rId2"/>
@@ -19,19 +19,20 @@
     <p:sldId id="264" r:id="rId10"/>
     <p:sldId id="268" r:id="rId11"/>
     <p:sldId id="265" r:id="rId12"/>
-    <p:sldId id="267" r:id="rId13"/>
-    <p:sldId id="266" r:id="rId14"/>
-    <p:sldId id="269" r:id="rId15"/>
+    <p:sldId id="270" r:id="rId13"/>
+    <p:sldId id="267" r:id="rId14"/>
+    <p:sldId id="266" r:id="rId15"/>
+    <p:sldId id="269" r:id="rId16"/>
   </p:sldIdLst>
   <p:sldSz cx="12192000" cy="6858000"/>
   <p:notesSz cx="6858000" cy="9144000"/>
   <p:embeddedFontLst>
     <p:embeddedFont>
       <p:font typeface="Century Schoolbook" panose="02040604050505020304" pitchFamily="18" charset="0"/>
-      <p:regular r:id="rId17"/>
-      <p:bold r:id="rId18"/>
-      <p:italic r:id="rId19"/>
-      <p:boldItalic r:id="rId20"/>
+      <p:regular r:id="rId18"/>
+      <p:bold r:id="rId19"/>
+      <p:italic r:id="rId20"/>
+      <p:boldItalic r:id="rId21"/>
     </p:embeddedFont>
   </p:embeddedFontLst>
   <p:defaultTextStyle>
@@ -268,7 +269,7 @@
       <p15:sldGuideLst xmlns:p15="http://schemas.microsoft.com/office/powerpoint/2012/main"/>
     </p:ext>
     <p:ext uri="http://customooxmlschemas.google.com/">
-      <go:slidesCustomData xmlns="" xmlns:mc="http://schemas.openxmlformats.org/markup-compatibility/2006" xmlns:mv="urn:schemas-microsoft-com:mac:vml" xmlns:c="http://schemas.openxmlformats.org/drawingml/2006/chart" xmlns:dgm="http://schemas.openxmlformats.org/drawingml/2006/diagram" xmlns:o="urn:schemas-microsoft-com:office:office" xmlns:v="urn:schemas-microsoft-com:vml" xmlns:pvml="urn:schemas-microsoft-com:office:powerpoint" xmlns:com="http://schemas.openxmlformats.org/drawingml/2006/compatibility" xmlns:p14="http://schemas.microsoft.com/office/powerpoint/2010/main" xmlns:p15="http://schemas.microsoft.com/office/powerpoint/2012/main" xmlns:ahyp="http://schemas.microsoft.com/office/drawing/2018/hyperlinkcolor" xmlns:go="http://customooxmlschemas.google.com/" r:id="rId21" roundtripDataSignature="AMtx7mj3d4EaMShFC+vrm4NiNnFInjn2pQ=="/>
+      <go:slidesCustomData xmlns:go="http://customooxmlschemas.google.com/" xmlns:ahyp="http://schemas.microsoft.com/office/drawing/2018/hyperlinkcolor" xmlns:p15="http://schemas.microsoft.com/office/powerpoint/2012/main" xmlns:p14="http://schemas.microsoft.com/office/powerpoint/2010/main" xmlns:com="http://schemas.openxmlformats.org/drawingml/2006/compatibility" xmlns:pvml="urn:schemas-microsoft-com:office:powerpoint" xmlns:v="urn:schemas-microsoft-com:vml" xmlns:o="urn:schemas-microsoft-com:office:office" xmlns:dgm="http://schemas.openxmlformats.org/drawingml/2006/diagram" xmlns:c="http://schemas.openxmlformats.org/drawingml/2006/chart" xmlns:mv="urn:schemas-microsoft-com:mac:vml" xmlns:mc="http://schemas.openxmlformats.org/markup-compatibility/2006" xmlns="" r:id="rId22" roundtripDataSignature="AMtx7mj3d4EaMShFC+vrm4NiNnFInjn2pQ=="/>
     </p:ext>
   </p:extLst>
 </p:presentation>
@@ -1214,6 +1215,115 @@
   <p:cSld>
     <p:spTree>
       <p:nvGrpSpPr>
+        <p:cNvPr id="1" name="Shape 169"/>
+        <p:cNvGrpSpPr/>
+        <p:nvPr/>
+      </p:nvGrpSpPr>
+      <p:grpSpPr>
+        <a:xfrm>
+          <a:off x="0" y="0"/>
+          <a:ext cx="0" cy="0"/>
+          <a:chOff x="0" y="0"/>
+          <a:chExt cx="0" cy="0"/>
+        </a:xfrm>
+      </p:grpSpPr>
+      <p:sp>
+        <p:nvSpPr>
+          <p:cNvPr id="170" name="Google Shape;170;p10:notes"/>
+          <p:cNvSpPr txBox="1">
+            <a:spLocks noGrp="1"/>
+          </p:cNvSpPr>
+          <p:nvPr>
+            <p:ph type="body" idx="1"/>
+          </p:nvPr>
+        </p:nvSpPr>
+        <p:spPr>
+          <a:xfrm>
+            <a:off x="685800" y="4343400"/>
+            <a:ext cx="5486400" cy="4114800"/>
+          </a:xfrm>
+          <a:prstGeom prst="rect">
+            <a:avLst/>
+          </a:prstGeom>
+        </p:spPr>
+        <p:txBody>
+          <a:bodyPr spcFirstLastPara="1" wrap="square" lIns="91425" tIns="91425" rIns="91425" bIns="91425" anchor="t" anchorCtr="0">
+            <a:noAutofit/>
+          </a:bodyPr>
+          <a:lstStyle/>
+          <a:p>
+            <a:pPr marL="0" lvl="0" indent="0" algn="l" rtl="0">
+              <a:spcBef>
+                <a:spcPts val="0"/>
+              </a:spcBef>
+              <a:spcAft>
+                <a:spcPts val="0"/>
+              </a:spcAft>
+              <a:buNone/>
+            </a:pPr>
+            <a:endParaRPr/>
+          </a:p>
+        </p:txBody>
+      </p:sp>
+      <p:sp>
+        <p:nvSpPr>
+          <p:cNvPr id="171" name="Google Shape;171;p10:notes"/>
+          <p:cNvSpPr>
+            <a:spLocks noGrp="1" noRot="1" noChangeAspect="1"/>
+          </p:cNvSpPr>
+          <p:nvPr>
+            <p:ph type="sldImg" idx="2"/>
+          </p:nvPr>
+        </p:nvSpPr>
+        <p:spPr>
+          <a:xfrm>
+            <a:off x="381000" y="685800"/>
+            <a:ext cx="6096000" cy="3429000"/>
+          </a:xfrm>
+          <a:custGeom>
+            <a:avLst/>
+            <a:gdLst/>
+            <a:ahLst/>
+            <a:cxnLst/>
+            <a:rect l="l" t="t" r="r" b="b"/>
+            <a:pathLst>
+              <a:path w="120000" h="120000" extrusionOk="0">
+                <a:moveTo>
+                  <a:pt x="0" y="0"/>
+                </a:moveTo>
+                <a:lnTo>
+                  <a:pt x="120000" y="0"/>
+                </a:lnTo>
+                <a:lnTo>
+                  <a:pt x="120000" y="120000"/>
+                </a:lnTo>
+                <a:lnTo>
+                  <a:pt x="0" y="120000"/>
+                </a:lnTo>
+                <a:close/>
+              </a:path>
+            </a:pathLst>
+          </a:custGeom>
+        </p:spPr>
+      </p:sp>
+    </p:spTree>
+    <p:extLst>
+      <p:ext uri="{BB962C8B-B14F-4D97-AF65-F5344CB8AC3E}">
+        <p14:creationId xmlns:p14="http://schemas.microsoft.com/office/powerpoint/2010/main" val="1620327583"/>
+      </p:ext>
+    </p:extLst>
+  </p:cSld>
+  <p:clrMapOvr>
+    <a:masterClrMapping/>
+  </p:clrMapOvr>
+</p:notes>
+</file>
+
+<file path=ppt/notesSlides/notesSlide13.xml><?xml version="1.0" encoding="utf-8"?>
+<p:notes xmlns:a="http://schemas.openxmlformats.org/drawingml/2006/main" xmlns:r="http://schemas.openxmlformats.org/officeDocument/2006/relationships" xmlns:p="http://schemas.openxmlformats.org/presentationml/2006/main" showMasterSp="0" showMasterPhAnim="0">
+  <p:cSld>
+    <p:spTree>
+      <p:nvGrpSpPr>
         <p:cNvPr id="1" name="Shape 175"/>
         <p:cNvGrpSpPr/>
         <p:nvPr/>
@@ -1260,6 +1370,25 @@
               </a:spcAft>
               <a:buNone/>
             </a:pPr>
+            <a:r>
+              <a:rPr lang="fi-FI" dirty="0"/>
+              <a:t>22.10. – 26.10.</a:t>
+            </a:r>
+          </a:p>
+          <a:p>
+            <a:pPr marL="0" lvl="0" indent="0" algn="l" rtl="0">
+              <a:spcBef>
+                <a:spcPts val="0"/>
+              </a:spcBef>
+              <a:spcAft>
+                <a:spcPts val="0"/>
+              </a:spcAft>
+              <a:buNone/>
+            </a:pPr>
+            <a:r>
+              <a:rPr lang="fi-FI" dirty="0"/>
+              <a:t>  Fixing/improving tasks 3 and 4</a:t>
+            </a:r>
             <a:endParaRPr dirty="0"/>
           </a:p>
         </p:txBody>
@@ -1313,7 +1442,7 @@
 </p:notes>
 </file>
 
-<file path=ppt/notesSlides/notesSlide13.xml><?xml version="1.0" encoding="utf-8"?>
+<file path=ppt/notesSlides/notesSlide14.xml><?xml version="1.0" encoding="utf-8"?>
 <p:notes xmlns:a="http://schemas.openxmlformats.org/drawingml/2006/main" xmlns:r="http://schemas.openxmlformats.org/officeDocument/2006/relationships" xmlns:p="http://schemas.openxmlformats.org/presentationml/2006/main" showMasterSp="0" showMasterPhAnim="0">
   <p:cSld>
     <p:spTree>
@@ -6403,6 +6532,285 @@
     <p:bg>
       <p:bgPr>
         <a:solidFill>
+          <a:srgbClr val="414141"/>
+        </a:solidFill>
+        <a:effectLst/>
+      </p:bgPr>
+    </p:bg>
+    <p:spTree>
+      <p:nvGrpSpPr>
+        <p:cNvPr id="1" name="Shape 172"/>
+        <p:cNvGrpSpPr/>
+        <p:nvPr/>
+      </p:nvGrpSpPr>
+      <p:grpSpPr>
+        <a:xfrm>
+          <a:off x="0" y="0"/>
+          <a:ext cx="0" cy="0"/>
+          <a:chOff x="0" y="0"/>
+          <a:chExt cx="0" cy="0"/>
+        </a:xfrm>
+      </p:grpSpPr>
+      <p:sp>
+        <p:nvSpPr>
+          <p:cNvPr id="173" name="Google Shape;173;p10"/>
+          <p:cNvSpPr txBox="1">
+            <a:spLocks noGrp="1"/>
+          </p:cNvSpPr>
+          <p:nvPr>
+            <p:ph type="title"/>
+          </p:nvPr>
+        </p:nvSpPr>
+        <p:spPr>
+          <a:xfrm>
+            <a:off x="1261872" y="365760"/>
+            <a:ext cx="9692640" cy="1325562"/>
+          </a:xfrm>
+          <a:prstGeom prst="rect">
+            <a:avLst/>
+          </a:prstGeom>
+          <a:noFill/>
+          <a:ln>
+            <a:noFill/>
+          </a:ln>
+        </p:spPr>
+        <p:txBody>
+          <a:bodyPr spcFirstLastPara="1" wrap="square" lIns="91425" tIns="45700" rIns="91425" bIns="45700" anchor="b" anchorCtr="0">
+            <a:normAutofit/>
+          </a:bodyPr>
+          <a:lstStyle/>
+          <a:p>
+            <a:pPr marL="0" lvl="0" indent="0" algn="l" rtl="0">
+              <a:lnSpc>
+                <a:spcPct val="90000"/>
+              </a:lnSpc>
+              <a:spcBef>
+                <a:spcPts val="0"/>
+              </a:spcBef>
+              <a:spcAft>
+                <a:spcPts val="0"/>
+              </a:spcAft>
+              <a:buClr>
+                <a:schemeClr val="lt1"/>
+              </a:buClr>
+              <a:buSzPts val="4400"/>
+              <a:buFont typeface="Century Schoolbook"/>
+              <a:buNone/>
+            </a:pPr>
+            <a:r>
+              <a:rPr lang="fi-FI" dirty="0"/>
+              <a:t>Task 9</a:t>
+            </a:r>
+            <a:br>
+              <a:rPr lang="fi-FI" dirty="0"/>
+            </a:br>
+            <a:r>
+              <a:rPr lang="fi-FI" dirty="0"/>
+              <a:t>(Plan for) GUI</a:t>
+            </a:r>
+            <a:endParaRPr dirty="0"/>
+          </a:p>
+        </p:txBody>
+      </p:sp>
+      <p:sp>
+        <p:nvSpPr>
+          <p:cNvPr id="174" name="Google Shape;174;p10"/>
+          <p:cNvSpPr txBox="1">
+            <a:spLocks noGrp="1"/>
+          </p:cNvSpPr>
+          <p:nvPr>
+            <p:ph type="body" idx="1"/>
+          </p:nvPr>
+        </p:nvSpPr>
+        <p:spPr>
+          <a:xfrm>
+            <a:off x="1261872" y="1828800"/>
+            <a:ext cx="9193570" cy="4351337"/>
+          </a:xfrm>
+          <a:prstGeom prst="rect">
+            <a:avLst/>
+          </a:prstGeom>
+          <a:noFill/>
+          <a:ln>
+            <a:noFill/>
+          </a:ln>
+        </p:spPr>
+        <p:txBody>
+          <a:bodyPr spcFirstLastPara="1" wrap="square" lIns="91425" tIns="45700" rIns="91425" bIns="45700" anchor="t" anchorCtr="0">
+            <a:normAutofit/>
+          </a:bodyPr>
+          <a:lstStyle/>
+          <a:p>
+            <a:pPr marL="457200" marR="0" lvl="0" indent="-320040" algn="l" defTabSz="914400" rtl="0" eaLnBrk="1" fontAlgn="auto" latinLnBrk="0" hangingPunct="1">
+              <a:lnSpc>
+                <a:spcPct val="95000"/>
+              </a:lnSpc>
+              <a:spcBef>
+                <a:spcPts val="1400"/>
+              </a:spcBef>
+              <a:spcAft>
+                <a:spcPts val="0"/>
+              </a:spcAft>
+              <a:buClr>
+                <a:srgbClr val="6F6F74"/>
+              </a:buClr>
+              <a:buSzPts val="1440"/>
+              <a:buFont typeface="Arial"/>
+              <a:buChar char="•"/>
+              <a:tabLst/>
+              <a:defRPr/>
+            </a:pPr>
+            <a:r>
+              <a:rPr lang="en-US" dirty="0">
+                <a:solidFill>
+                  <a:srgbClr val="FFFFFF"/>
+                </a:solidFill>
+              </a:rPr>
+              <a:t>We want to display our results in a user-friendly manner by generating a graphical user interface.</a:t>
+            </a:r>
+          </a:p>
+          <a:p>
+            <a:pPr marL="457200" marR="0" lvl="0" indent="-320040" algn="l" defTabSz="914400" rtl="0" eaLnBrk="1" fontAlgn="auto" latinLnBrk="0" hangingPunct="1">
+              <a:lnSpc>
+                <a:spcPct val="95000"/>
+              </a:lnSpc>
+              <a:spcBef>
+                <a:spcPts val="1400"/>
+              </a:spcBef>
+              <a:spcAft>
+                <a:spcPts val="0"/>
+              </a:spcAft>
+              <a:buClr>
+                <a:srgbClr val="6F6F74"/>
+              </a:buClr>
+              <a:buSzPts val="1440"/>
+              <a:buFont typeface="Arial"/>
+              <a:buChar char="•"/>
+              <a:tabLst/>
+              <a:defRPr/>
+            </a:pPr>
+            <a:endParaRPr lang="en-US" dirty="0">
+              <a:solidFill>
+                <a:srgbClr val="FFFFFF"/>
+              </a:solidFill>
+            </a:endParaRPr>
+          </a:p>
+          <a:p>
+            <a:pPr marL="457200" marR="0" lvl="0" indent="-320040" algn="l" defTabSz="914400" rtl="0" eaLnBrk="1" fontAlgn="auto" latinLnBrk="0" hangingPunct="1">
+              <a:lnSpc>
+                <a:spcPct val="95000"/>
+              </a:lnSpc>
+              <a:spcBef>
+                <a:spcPts val="1400"/>
+              </a:spcBef>
+              <a:spcAft>
+                <a:spcPts val="0"/>
+              </a:spcAft>
+              <a:buClr>
+                <a:srgbClr val="6F6F74"/>
+              </a:buClr>
+              <a:buSzPts val="1440"/>
+              <a:buFont typeface="Arial"/>
+              <a:buChar char="•"/>
+              <a:tabLst/>
+              <a:defRPr/>
+            </a:pPr>
+            <a:r>
+              <a:rPr lang="en-US" dirty="0">
+                <a:solidFill>
+                  <a:srgbClr val="FFFFFF"/>
+                </a:solidFill>
+              </a:rPr>
+              <a:t>User should be able to generate and view graphs</a:t>
+            </a:r>
+          </a:p>
+          <a:p>
+            <a:pPr lvl="1">
+              <a:buClr>
+                <a:srgbClr val="6F6F74"/>
+              </a:buClr>
+              <a:defRPr/>
+            </a:pPr>
+            <a:r>
+              <a:rPr lang="en-US" dirty="0">
+                <a:solidFill>
+                  <a:srgbClr val="FFFFFF"/>
+                </a:solidFill>
+              </a:rPr>
+              <a:t>Also ability to save and load previous results due to size of datasets</a:t>
+            </a:r>
+          </a:p>
+          <a:p>
+            <a:pPr lvl="1">
+              <a:buClr>
+                <a:srgbClr val="6F6F74"/>
+              </a:buClr>
+              <a:defRPr/>
+            </a:pPr>
+            <a:endParaRPr lang="en-US" dirty="0">
+              <a:solidFill>
+                <a:srgbClr val="FFFFFF"/>
+              </a:solidFill>
+            </a:endParaRPr>
+          </a:p>
+          <a:p>
+            <a:pPr>
+              <a:buClr>
+                <a:srgbClr val="6F6F74"/>
+              </a:buClr>
+              <a:defRPr/>
+            </a:pPr>
+            <a:r>
+              <a:rPr lang="en-US" dirty="0">
+                <a:solidFill>
+                  <a:srgbClr val="FFFFFF"/>
+                </a:solidFill>
+              </a:rPr>
+              <a:t>Likely to be develop using </a:t>
+            </a:r>
+            <a:r>
+              <a:rPr lang="en-US" dirty="0" err="1">
+                <a:solidFill>
+                  <a:srgbClr val="FFFFFF"/>
+                </a:solidFill>
+              </a:rPr>
+              <a:t>Tkinter</a:t>
+            </a:r>
+            <a:r>
+              <a:rPr lang="en-US" dirty="0">
+                <a:solidFill>
+                  <a:srgbClr val="FFFFFF"/>
+                </a:solidFill>
+              </a:rPr>
+              <a:t> and matplotlib Python libraries</a:t>
+            </a:r>
+            <a:endParaRPr lang="fi-FI" dirty="0">
+              <a:solidFill>
+                <a:schemeClr val="accent2"/>
+              </a:solidFill>
+            </a:endParaRPr>
+          </a:p>
+        </p:txBody>
+      </p:sp>
+    </p:spTree>
+    <p:extLst>
+      <p:ext uri="{BB962C8B-B14F-4D97-AF65-F5344CB8AC3E}">
+        <p14:creationId xmlns:p14="http://schemas.microsoft.com/office/powerpoint/2010/main" val="888895836"/>
+      </p:ext>
+    </p:extLst>
+  </p:cSld>
+  <p:clrMapOvr>
+    <a:masterClrMapping/>
+  </p:clrMapOvr>
+</p:sld>
+</file>
+
+<file path=ppt/slides/slide13.xml><?xml version="1.0" encoding="utf-8"?>
+<p:sld xmlns:a="http://schemas.openxmlformats.org/drawingml/2006/main" xmlns:r="http://schemas.openxmlformats.org/officeDocument/2006/relationships" xmlns:p="http://schemas.openxmlformats.org/presentationml/2006/main">
+  <p:cSld>
+    <p:bg>
+      <p:bgPr>
+        <a:solidFill>
           <a:schemeClr val="tx1">
             <a:lumMod val="75000"/>
             <a:lumOff val="25000"/>
@@ -6772,7 +7180,7 @@
 </p:sld>
 </file>
 
-<file path=ppt/slides/slide13.xml><?xml version="1.0" encoding="utf-8"?>
+<file path=ppt/slides/slide14.xml><?xml version="1.0" encoding="utf-8"?>
 <p:sld xmlns:a="http://schemas.openxmlformats.org/drawingml/2006/main" xmlns:r="http://schemas.openxmlformats.org/officeDocument/2006/relationships" xmlns:p="http://schemas.openxmlformats.org/presentationml/2006/main">
   <p:cSld>
     <p:bg>
@@ -7653,7 +8061,7 @@
 </p:sld>
 </file>
 
-<file path=ppt/slides/slide14.xml><?xml version="1.0" encoding="utf-8"?>
+<file path=ppt/slides/slide15.xml><?xml version="1.0" encoding="utf-8"?>
 <p:sld xmlns:a="http://schemas.openxmlformats.org/drawingml/2006/main" xmlns:r="http://schemas.openxmlformats.org/officeDocument/2006/relationships" xmlns:p="http://schemas.openxmlformats.org/presentationml/2006/main">
   <p:cSld>
     <p:bg>

</xml_diff>